<commit_message>
Fill out process document
</commit_message>
<xml_diff>
--- a/Project 1/Process Document.pptx
+++ b/Project 1/Process Document.pptx
@@ -212,7 +212,7 @@
           <a:p>
             <a:fld id="{3D6BBBCA-9A3D-1147-8BCA-5D67D128DFF7}" type="datetimeFigureOut">
               <a:rPr lang="en-US" smtClean="0"/>
-              <a:t>10/2/25</a:t>
+              <a:t>10/8/25</a:t>
             </a:fld>
             <a:endParaRPr lang="en-US"/>
           </a:p>
@@ -544,6 +544,90 @@
           <a:p>
             <a:fld id="{748AA364-B34F-9543-9E67-E457A5D3E16E}" type="slidenum">
               <a:rPr lang="en-US" smtClean="0"/>
+              <a:t>3</a:t>
+            </a:fld>
+            <a:endParaRPr lang="en-US"/>
+          </a:p>
+        </p:txBody>
+      </p:sp>
+    </p:spTree>
+    <p:extLst>
+      <p:ext uri="{BB962C8B-B14F-4D97-AF65-F5344CB8AC3E}">
+        <p14:creationId xmlns:p14="http://schemas.microsoft.com/office/powerpoint/2010/main" val="2447440482"/>
+      </p:ext>
+    </p:extLst>
+  </p:cSld>
+  <p:clrMapOvr>
+    <a:masterClrMapping/>
+  </p:clrMapOvr>
+</p:notes>
+</file>
+
+<file path=ppt/notesSlides/notesSlide2.xml><?xml version="1.0" encoding="utf-8"?>
+<p:notes xmlns:a="http://schemas.openxmlformats.org/drawingml/2006/main" xmlns:r="http://schemas.openxmlformats.org/officeDocument/2006/relationships" xmlns:p="http://schemas.openxmlformats.org/presentationml/2006/main">
+  <p:cSld>
+    <p:spTree>
+      <p:nvGrpSpPr>
+        <p:cNvPr id="1" name=""/>
+        <p:cNvGrpSpPr/>
+        <p:nvPr/>
+      </p:nvGrpSpPr>
+      <p:grpSpPr>
+        <a:xfrm>
+          <a:off x="0" y="0"/>
+          <a:ext cx="0" cy="0"/>
+          <a:chOff x="0" y="0"/>
+          <a:chExt cx="0" cy="0"/>
+        </a:xfrm>
+      </p:grpSpPr>
+      <p:sp>
+        <p:nvSpPr>
+          <p:cNvPr id="2" name="Slide Image Placeholder 1"/>
+          <p:cNvSpPr>
+            <a:spLocks noGrp="1" noRot="1" noChangeAspect="1"/>
+          </p:cNvSpPr>
+          <p:nvPr>
+            <p:ph type="sldImg"/>
+          </p:nvPr>
+        </p:nvSpPr>
+        <p:spPr/>
+      </p:sp>
+      <p:sp>
+        <p:nvSpPr>
+          <p:cNvPr id="3" name="Notes Placeholder 2"/>
+          <p:cNvSpPr>
+            <a:spLocks noGrp="1"/>
+          </p:cNvSpPr>
+          <p:nvPr>
+            <p:ph type="body" idx="1"/>
+          </p:nvPr>
+        </p:nvSpPr>
+        <p:spPr/>
+        <p:txBody>
+          <a:bodyPr/>
+          <a:lstStyle/>
+          <a:p>
+            <a:endParaRPr lang="en-US" dirty="0"/>
+          </a:p>
+        </p:txBody>
+      </p:sp>
+      <p:sp>
+        <p:nvSpPr>
+          <p:cNvPr id="4" name="Slide Number Placeholder 3"/>
+          <p:cNvSpPr>
+            <a:spLocks noGrp="1"/>
+          </p:cNvSpPr>
+          <p:nvPr>
+            <p:ph type="sldNum" sz="quarter" idx="5"/>
+          </p:nvPr>
+        </p:nvSpPr>
+        <p:spPr/>
+        <p:txBody>
+          <a:bodyPr/>
+          <a:lstStyle/>
+          <a:p>
+            <a:fld id="{748AA364-B34F-9543-9E67-E457A5D3E16E}" type="slidenum">
+              <a:rPr lang="en-US" smtClean="0"/>
               <a:t>4</a:t>
             </a:fld>
             <a:endParaRPr lang="en-US"/>
@@ -563,7 +647,91 @@
 </p:notes>
 </file>
 
-<file path=ppt/notesSlides/notesSlide2.xml><?xml version="1.0" encoding="utf-8"?>
+<file path=ppt/notesSlides/notesSlide3.xml><?xml version="1.0" encoding="utf-8"?>
+<p:notes xmlns:a="http://schemas.openxmlformats.org/drawingml/2006/main" xmlns:r="http://schemas.openxmlformats.org/officeDocument/2006/relationships" xmlns:p="http://schemas.openxmlformats.org/presentationml/2006/main">
+  <p:cSld>
+    <p:spTree>
+      <p:nvGrpSpPr>
+        <p:cNvPr id="1" name=""/>
+        <p:cNvGrpSpPr/>
+        <p:nvPr/>
+      </p:nvGrpSpPr>
+      <p:grpSpPr>
+        <a:xfrm>
+          <a:off x="0" y="0"/>
+          <a:ext cx="0" cy="0"/>
+          <a:chOff x="0" y="0"/>
+          <a:chExt cx="0" cy="0"/>
+        </a:xfrm>
+      </p:grpSpPr>
+      <p:sp>
+        <p:nvSpPr>
+          <p:cNvPr id="2" name="Slide Image Placeholder 1"/>
+          <p:cNvSpPr>
+            <a:spLocks noGrp="1" noRot="1" noChangeAspect="1"/>
+          </p:cNvSpPr>
+          <p:nvPr>
+            <p:ph type="sldImg"/>
+          </p:nvPr>
+        </p:nvSpPr>
+        <p:spPr/>
+      </p:sp>
+      <p:sp>
+        <p:nvSpPr>
+          <p:cNvPr id="3" name="Notes Placeholder 2"/>
+          <p:cNvSpPr>
+            <a:spLocks noGrp="1"/>
+          </p:cNvSpPr>
+          <p:nvPr>
+            <p:ph type="body" idx="1"/>
+          </p:nvPr>
+        </p:nvSpPr>
+        <p:spPr/>
+        <p:txBody>
+          <a:bodyPr/>
+          <a:lstStyle/>
+          <a:p>
+            <a:endParaRPr lang="en-US" dirty="0"/>
+          </a:p>
+        </p:txBody>
+      </p:sp>
+      <p:sp>
+        <p:nvSpPr>
+          <p:cNvPr id="4" name="Slide Number Placeholder 3"/>
+          <p:cNvSpPr>
+            <a:spLocks noGrp="1"/>
+          </p:cNvSpPr>
+          <p:nvPr>
+            <p:ph type="sldNum" sz="quarter" idx="5"/>
+          </p:nvPr>
+        </p:nvSpPr>
+        <p:spPr/>
+        <p:txBody>
+          <a:bodyPr/>
+          <a:lstStyle/>
+          <a:p>
+            <a:fld id="{748AA364-B34F-9543-9E67-E457A5D3E16E}" type="slidenum">
+              <a:rPr lang="en-US" smtClean="0"/>
+              <a:t>5</a:t>
+            </a:fld>
+            <a:endParaRPr lang="en-US"/>
+          </a:p>
+        </p:txBody>
+      </p:sp>
+    </p:spTree>
+    <p:extLst>
+      <p:ext uri="{BB962C8B-B14F-4D97-AF65-F5344CB8AC3E}">
+        <p14:creationId xmlns:p14="http://schemas.microsoft.com/office/powerpoint/2010/main" val="1492519627"/>
+      </p:ext>
+    </p:extLst>
+  </p:cSld>
+  <p:clrMapOvr>
+    <a:masterClrMapping/>
+  </p:clrMapOvr>
+</p:notes>
+</file>
+
+<file path=ppt/notesSlides/notesSlide4.xml><?xml version="1.0" encoding="utf-8"?>
 <p:notes xmlns:a="http://schemas.openxmlformats.org/drawingml/2006/main" xmlns:r="http://schemas.openxmlformats.org/officeDocument/2006/relationships" xmlns:p="http://schemas.openxmlformats.org/presentationml/2006/main">
   <p:cSld>
     <p:spTree>
@@ -778,7 +946,7 @@
           <a:p>
             <a:fld id="{052CEAA0-CEA8-4860-9757-7A11AC3F23CB}" type="datetimeFigureOut">
               <a:rPr lang="en-US" smtClean="0"/>
-              <a:t>10/2/25</a:t>
+              <a:t>10/8/25</a:t>
             </a:fld>
             <a:endParaRPr lang="en-US"/>
           </a:p>
@@ -948,7 +1116,7 @@
           <a:p>
             <a:fld id="{052CEAA0-CEA8-4860-9757-7A11AC3F23CB}" type="datetimeFigureOut">
               <a:rPr lang="en-US" smtClean="0"/>
-              <a:t>10/2/25</a:t>
+              <a:t>10/8/25</a:t>
             </a:fld>
             <a:endParaRPr lang="en-US"/>
           </a:p>
@@ -1128,7 +1296,7 @@
           <a:p>
             <a:fld id="{052CEAA0-CEA8-4860-9757-7A11AC3F23CB}" type="datetimeFigureOut">
               <a:rPr lang="en-US" smtClean="0"/>
-              <a:t>10/2/25</a:t>
+              <a:t>10/8/25</a:t>
             </a:fld>
             <a:endParaRPr lang="en-US"/>
           </a:p>
@@ -1298,7 +1466,7 @@
           <a:p>
             <a:fld id="{052CEAA0-CEA8-4860-9757-7A11AC3F23CB}" type="datetimeFigureOut">
               <a:rPr lang="en-US" smtClean="0"/>
-              <a:t>10/2/25</a:t>
+              <a:t>10/8/25</a:t>
             </a:fld>
             <a:endParaRPr lang="en-US"/>
           </a:p>
@@ -1544,7 +1712,7 @@
           <a:p>
             <a:fld id="{052CEAA0-CEA8-4860-9757-7A11AC3F23CB}" type="datetimeFigureOut">
               <a:rPr lang="en-US" smtClean="0"/>
-              <a:t>10/2/25</a:t>
+              <a:t>10/8/25</a:t>
             </a:fld>
             <a:endParaRPr lang="en-US"/>
           </a:p>
@@ -1776,7 +1944,7 @@
           <a:p>
             <a:fld id="{052CEAA0-CEA8-4860-9757-7A11AC3F23CB}" type="datetimeFigureOut">
               <a:rPr lang="en-US" smtClean="0"/>
-              <a:t>10/2/25</a:t>
+              <a:t>10/8/25</a:t>
             </a:fld>
             <a:endParaRPr lang="en-US"/>
           </a:p>
@@ -2143,7 +2311,7 @@
           <a:p>
             <a:fld id="{052CEAA0-CEA8-4860-9757-7A11AC3F23CB}" type="datetimeFigureOut">
               <a:rPr lang="en-US" smtClean="0"/>
-              <a:t>10/2/25</a:t>
+              <a:t>10/8/25</a:t>
             </a:fld>
             <a:endParaRPr lang="en-US"/>
           </a:p>
@@ -2261,7 +2429,7 @@
           <a:p>
             <a:fld id="{052CEAA0-CEA8-4860-9757-7A11AC3F23CB}" type="datetimeFigureOut">
               <a:rPr lang="en-US" smtClean="0"/>
-              <a:t>10/2/25</a:t>
+              <a:t>10/8/25</a:t>
             </a:fld>
             <a:endParaRPr lang="en-US"/>
           </a:p>
@@ -2356,7 +2524,7 @@
           <a:p>
             <a:fld id="{052CEAA0-CEA8-4860-9757-7A11AC3F23CB}" type="datetimeFigureOut">
               <a:rPr lang="en-US" smtClean="0"/>
-              <a:t>10/2/25</a:t>
+              <a:t>10/8/25</a:t>
             </a:fld>
             <a:endParaRPr lang="en-US"/>
           </a:p>
@@ -2633,7 +2801,7 @@
           <a:p>
             <a:fld id="{052CEAA0-CEA8-4860-9757-7A11AC3F23CB}" type="datetimeFigureOut">
               <a:rPr lang="en-US" smtClean="0"/>
-              <a:t>10/2/25</a:t>
+              <a:t>10/8/25</a:t>
             </a:fld>
             <a:endParaRPr lang="en-US"/>
           </a:p>
@@ -2890,7 +3058,7 @@
           <a:p>
             <a:fld id="{052CEAA0-CEA8-4860-9757-7A11AC3F23CB}" type="datetimeFigureOut">
               <a:rPr lang="en-US" smtClean="0"/>
-              <a:t>10/2/25</a:t>
+              <a:t>10/8/25</a:t>
             </a:fld>
             <a:endParaRPr lang="en-US"/>
           </a:p>
@@ -3103,7 +3271,7 @@
           <a:p>
             <a:fld id="{052CEAA0-CEA8-4860-9757-7A11AC3F23CB}" type="datetimeFigureOut">
               <a:rPr lang="en-US" smtClean="0"/>
-              <a:t>10/2/25</a:t>
+              <a:t>10/8/25</a:t>
             </a:fld>
             <a:endParaRPr lang="en-US"/>
           </a:p>
@@ -3529,7 +3697,10 @@
           <a:bodyPr/>
           <a:lstStyle/>
           <a:p>
-            <a:endParaRPr lang="en-US" dirty="0"/>
+            <a:r>
+              <a:rPr lang="en-US" dirty="0"/>
+              <a:t>Flappy Pidgeon</a:t>
+            </a:r>
           </a:p>
         </p:txBody>
       </p:sp>
@@ -3834,6 +4005,35 @@
               <a:t>What is something you are struggling with in this project?</a:t>
             </a:r>
           </a:p>
+          <a:p>
+            <a:pPr lvl="1"/>
+            <a:r>
+              <a:rPr lang="en-US" dirty="0"/>
+              <a:t>It takes me a lot longer to find a good sprite that works well with the project than actually implementing the sprite into the project.</a:t>
+            </a:r>
+          </a:p>
+          <a:p>
+            <a:pPr lvl="1"/>
+            <a:endParaRPr lang="en-US" dirty="0"/>
+          </a:p>
+          <a:p>
+            <a:pPr lvl="1"/>
+            <a:r>
+              <a:rPr lang="en-US" dirty="0"/>
+              <a:t>I was using input to control how to start the game, now I am trying to understand how to implement buttons that call different methods based on the signal emitted.</a:t>
+            </a:r>
+          </a:p>
+          <a:p>
+            <a:pPr lvl="1"/>
+            <a:endParaRPr lang="en-US" dirty="0"/>
+          </a:p>
+          <a:p>
+            <a:pPr lvl="1"/>
+            <a:r>
+              <a:rPr lang="en-US" dirty="0"/>
+              <a:t>The moving ground isn’t looping seamlessly but it is becoming too much of a headache to nitpick over.</a:t>
+            </a:r>
+          </a:p>
         </p:txBody>
       </p:sp>
     </p:spTree>
@@ -3934,21 +4134,29 @@
             <a:pPr lvl="1"/>
             <a:r>
               <a:rPr lang="en-US" dirty="0"/>
-              <a:t>Balance</a:t>
+              <a:t>I need to balance the span between the top and bottom of the pipe in order to make the game challenging but not impossible. Adjusting the speed of the pipes makes the game harder.</a:t>
             </a:r>
           </a:p>
           <a:p>
             <a:pPr lvl="1"/>
             <a:r>
               <a:rPr lang="en-US" dirty="0"/>
-              <a:t>Emphasis</a:t>
+              <a:t>I am going for a synth city vibe and the </a:t>
+            </a:r>
+            <a:r>
+              <a:rPr lang="en-US" dirty="0" err="1"/>
+              <a:t>pidgeon</a:t>
+            </a:r>
+            <a:r>
+              <a:rPr lang="en-US" dirty="0"/>
+              <a:t> fits the theme as a city bird.</a:t>
             </a:r>
           </a:p>
           <a:p>
             <a:pPr lvl="1"/>
             <a:r>
               <a:rPr lang="en-US" dirty="0"/>
-              <a:t>Movement</a:t>
+              <a:t>I am satisfied with the movement of my game, the flap function works as intended and feels responsive.</a:t>
             </a:r>
           </a:p>
         </p:txBody>
@@ -4051,19 +4259,15 @@
             <a:pPr lvl="1"/>
             <a:r>
               <a:rPr lang="en-US" dirty="0"/>
-              <a:t>How you are learning to “structure” your project so it is maintainable long term</a:t>
+              <a:t>It is easy to group items based on their file extension. Being able to find the script you need to adjust quickly is a must.</a:t>
             </a:r>
           </a:p>
           <a:p>
             <a:pPr lvl="1"/>
             <a:r>
               <a:rPr lang="en-US" dirty="0"/>
-              <a:t>Your approaches and strategies to messaging between objects in Godot</a:t>
-            </a:r>
-          </a:p>
-          <a:p>
-            <a:pPr lvl="1"/>
-            <a:endParaRPr lang="en-US" dirty="0"/>
+              <a:t>I used a lot of signals to make connection between objects in Godot. If a pipe or ground detects a body on entered, it emits a signal, that signal calls a method in another object if emitted.</a:t>
+            </a:r>
           </a:p>
         </p:txBody>
       </p:sp>
@@ -4187,7 +4391,11 @@
             </a:pPr>
             <a:r>
               <a:rPr lang="en-US" dirty="0"/>
-              <a:t>Project progress			poor	acceptable	excellent</a:t>
+              <a:t>Project progress			poor	acceptable	</a:t>
+            </a:r>
+            <a:r>
+              <a:rPr lang="en-US" b="1" dirty="0"/>
+              <a:t>excellent</a:t>
             </a:r>
           </a:p>
           <a:p>
@@ -4196,7 +4404,15 @@
             </a:pPr>
             <a:r>
               <a:rPr lang="en-US" dirty="0"/>
-              <a:t>Variable naming			poor	acceptable	excellent</a:t>
+              <a:t>Variable naming			poor	</a:t>
+            </a:r>
+            <a:r>
+              <a:rPr lang="en-US" b="1" dirty="0"/>
+              <a:t>acceptable</a:t>
+            </a:r>
+            <a:r>
+              <a:rPr lang="en-US" dirty="0"/>
+              <a:t>	excellent</a:t>
             </a:r>
           </a:p>
           <a:p>
@@ -4205,7 +4421,11 @@
             </a:pPr>
             <a:r>
               <a:rPr lang="en-US" dirty="0"/>
-              <a:t>Debugging / problem solving	poor	acceptable	excellent</a:t>
+              <a:t>Debugging / problem solving	poor	acceptable	</a:t>
+            </a:r>
+            <a:r>
+              <a:rPr lang="en-US" b="1" dirty="0"/>
+              <a:t>excellent</a:t>
             </a:r>
           </a:p>
           <a:p>
@@ -4214,7 +4434,11 @@
             </a:pPr>
             <a:r>
               <a:rPr lang="en-US" dirty="0"/>
-              <a:t>Godot exploration			poor	acceptable	excellent</a:t>
+              <a:t>Godot exploration			poor	acceptable	</a:t>
+            </a:r>
+            <a:r>
+              <a:rPr lang="en-US" b="1" dirty="0"/>
+              <a:t>excellent</a:t>
             </a:r>
           </a:p>
           <a:p>
@@ -4223,7 +4447,15 @@
             </a:pPr>
             <a:r>
               <a:rPr lang="en-US" dirty="0"/>
-              <a:t>Polish plans				poor	acceptable	excellent</a:t>
+              <a:t>Polish plans				poor	</a:t>
+            </a:r>
+            <a:r>
+              <a:rPr lang="en-US" b="1" dirty="0"/>
+              <a:t>acceptable</a:t>
+            </a:r>
+            <a:r>
+              <a:rPr lang="en-US" dirty="0"/>
+              <a:t>	excellent</a:t>
             </a:r>
           </a:p>
           <a:p>
@@ -4418,14 +4650,10 @@
         </p:nvSpPr>
         <p:spPr/>
         <p:txBody>
-          <a:bodyPr/>
-          <a:lstStyle/>
-          <a:p>
-            <a:r>
-              <a:rPr lang="en-US" dirty="0"/>
-              <a:t>Delete and add 5-ish bullet points about your project. Cover at least one of each below</a:t>
-            </a:r>
-          </a:p>
+          <a:bodyPr>
+            <a:normAutofit fontScale="92500" lnSpcReduction="10000"/>
+          </a:bodyPr>
+          <a:lstStyle/>
           <a:p>
             <a:r>
               <a:rPr lang="en-US" dirty="0"/>
@@ -4436,7 +4664,22 @@
             <a:pPr lvl="1"/>
             <a:r>
               <a:rPr lang="en-US" dirty="0"/>
-              <a:t>Use some of these words: variables, code blocks, conditions, control flow, algorithm, planning, files, readability, debugging</a:t>
+              <a:t>The control flow of my program is like this: New Game -&gt; Start Game -&gt; clears all objects, resets bird pos, reset score -&gt; check </a:t>
+            </a:r>
+            <a:r>
+              <a:rPr lang="en-US" dirty="0" err="1"/>
+              <a:t>if_falling</a:t>
+            </a:r>
+            <a:r>
+              <a:rPr lang="en-US" dirty="0"/>
+              <a:t> -&gt; Game Over -&gt; Quit</a:t>
+            </a:r>
+          </a:p>
+          <a:p>
+            <a:pPr lvl="1"/>
+            <a:r>
+              <a:rPr lang="en-US" dirty="0"/>
+              <a:t>I use condition blocks to check if the game is running, if the game is over, if the bird is flying, and if the bird is falling. This allows me to control the flow of the game and make it respond to other entities.</a:t>
             </a:r>
           </a:p>
           <a:p>
@@ -4449,13 +4692,36 @@
             <a:pPr lvl="1"/>
             <a:r>
               <a:rPr lang="en-US" dirty="0"/>
-              <a:t>Use some of these words: reactive, eye-catching, guiding, alert, joyful, unintended, contrast, similarity, flow</a:t>
+              <a:t>My game is very…purple. Wasn’t my intention however I love the synth city vibe and it ended up working out in my opinion. It is hard to see the </a:t>
+            </a:r>
+            <a:r>
+              <a:rPr lang="en-US" dirty="0" err="1"/>
+              <a:t>pidgeon</a:t>
+            </a:r>
+            <a:r>
+              <a:rPr lang="en-US" dirty="0"/>
+              <a:t> however.</a:t>
             </a:r>
           </a:p>
           <a:p>
             <a:r>
               <a:rPr lang="en-US" dirty="0"/>
               <a:t>Major concepts learned </a:t>
+            </a:r>
+          </a:p>
+          <a:p>
+            <a:pPr lvl="1"/>
+            <a:r>
+              <a:rPr lang="en-US" dirty="0"/>
+              <a:t>I learned about </a:t>
+            </a:r>
+            <a:r>
+              <a:rPr lang="en-US" dirty="0" err="1"/>
+              <a:t>gdshader</a:t>
+            </a:r>
+            <a:r>
+              <a:rPr lang="en-US" dirty="0"/>
+              <a:t> scripts, am more comfortable with signals and collision shapes, as well as grouping and instantiating other scenes inside of a separate scene.</a:t>
             </a:r>
           </a:p>
         </p:txBody>
@@ -4551,40 +4817,45 @@
           <a:p>
             <a:r>
               <a:rPr lang="en-US" dirty="0"/>
-              <a:t>The goal is to create a vampire survivors/</a:t>
+              <a:t>The goal is to create flappy birds like game.</a:t>
+            </a:r>
+          </a:p>
+          <a:p>
+            <a:r>
+              <a:rPr lang="en-US" dirty="0"/>
+              <a:t>Players will control a </a:t>
             </a:r>
             <a:r>
               <a:rPr lang="en-US" dirty="0" err="1"/>
-              <a:t>brotato</a:t>
-            </a:r>
-            <a:r>
-              <a:rPr lang="en-US" dirty="0"/>
-              <a:t> like game where enemies swarm you and the goal is to survive, all the while you search for pick-ups that assist you.</a:t>
-            </a:r>
-          </a:p>
-          <a:p>
-            <a:r>
-              <a:rPr lang="en-US" dirty="0"/>
-              <a:t>Players will have a default weapon that is reliable with infinite ammo but weak.</a:t>
-            </a:r>
-          </a:p>
-          <a:p>
-            <a:r>
-              <a:rPr lang="en-US" dirty="0"/>
-              <a:t>Better weapons will be scattered around the map to encourage players to search for them.</a:t>
-            </a:r>
-          </a:p>
-          <a:p>
-            <a:r>
-              <a:rPr lang="en-US" dirty="0"/>
-              <a:t>Enemies will spawn off screen and track towards the player.</a:t>
+              <a:t>pidgeon</a:t>
+            </a:r>
+            <a:r>
+              <a:rPr lang="en-US" dirty="0"/>
+              <a:t> that has to fly </a:t>
+            </a:r>
+            <a:r>
+              <a:rPr lang="en-US" dirty="0" err="1"/>
+              <a:t>inbetween</a:t>
+            </a:r>
+            <a:r>
+              <a:rPr lang="en-US" dirty="0"/>
+              <a:t> obstacles.</a:t>
+            </a:r>
+          </a:p>
+          <a:p>
+            <a:r>
+              <a:rPr lang="en-US" dirty="0"/>
+              <a:t>A score is incremented for each successful obstacle passed.</a:t>
             </a:r>
           </a:p>
           <a:p>
             <a:pPr marL="0" indent="0">
               <a:buNone/>
             </a:pPr>
-            <a:endParaRPr lang="en-US" dirty="0"/>
+            <a:r>
+              <a:rPr lang="en-US" dirty="0"/>
+              <a:t>Obstacles will be of varying height and gradually move faster.</a:t>
+            </a:r>
           </a:p>
         </p:txBody>
       </p:sp>
@@ -4658,106 +4929,42 @@
       </p:sp>
       <p:pic>
         <p:nvPicPr>
-          <p:cNvPr id="1026" name="Picture 2" descr="Vampire Survivors - Apps on Google Play">
+          <p:cNvPr id="4" name="Content Placeholder 3">
             <a:extLst>
               <a:ext uri="{FF2B5EF4-FFF2-40B4-BE49-F238E27FC236}">
-                <a16:creationId xmlns:a16="http://schemas.microsoft.com/office/drawing/2014/main" id="{60ACA548-F79B-2BB0-0BFD-7D89443DD73A}"/>
+                <a16:creationId xmlns:a16="http://schemas.microsoft.com/office/drawing/2014/main" id="{0D67BE79-02E7-5769-A34A-F97934B74F31}"/>
               </a:ext>
             </a:extLst>
           </p:cNvPr>
           <p:cNvPicPr>
-            <a:picLocks noGrp="1" noChangeAspect="1" noChangeArrowheads="1"/>
+            <a:picLocks noGrp="1" noChangeAspect="1"/>
           </p:cNvPicPr>
           <p:nvPr>
             <p:ph idx="1"/>
           </p:nvPr>
         </p:nvPicPr>
         <p:blipFill>
-          <a:blip r:embed="rId2">
-            <a:extLst>
-              <a:ext uri="{28A0092B-C50C-407E-A947-70E740481C1C}">
-                <a14:useLocalDpi xmlns:a14="http://schemas.microsoft.com/office/drawing/2010/main" val="0"/>
-              </a:ext>
-            </a:extLst>
-          </a:blip>
-          <a:srcRect/>
+          <a:blip r:embed="rId3"/>
           <a:stretch>
             <a:fillRect/>
           </a:stretch>
         </p:blipFill>
-        <p:spPr bwMode="auto">
+        <p:spPr>
           <a:xfrm>
-            <a:off x="863544" y="1690688"/>
-            <a:ext cx="4401286" cy="2481262"/>
+            <a:off x="838200" y="1803705"/>
+            <a:ext cx="4835179" cy="3739845"/>
           </a:xfrm>
           <a:prstGeom prst="rect">
             <a:avLst/>
           </a:prstGeom>
-          <a:noFill/>
-          <a:extLst>
-            <a:ext uri="{909E8E84-426E-40DD-AFC4-6F175D3DCCD1}">
-              <a14:hiddenFill xmlns:a14="http://schemas.microsoft.com/office/drawing/2010/main">
-                <a:solidFill>
-                  <a:srgbClr val="FFFFFF"/>
-                </a:solidFill>
-              </a14:hiddenFill>
-            </a:ext>
-          </a:extLst>
         </p:spPr>
       </p:pic>
       <p:pic>
         <p:nvPicPr>
-          <p:cNvPr id="1028" name="Picture 4" descr="Brotato – Review – Higher Plain Games">
+          <p:cNvPr id="7" name="Picture 6" descr="A screenshot of a video game&#10;&#10;AI-generated content may be incorrect.">
             <a:extLst>
               <a:ext uri="{FF2B5EF4-FFF2-40B4-BE49-F238E27FC236}">
-                <a16:creationId xmlns:a16="http://schemas.microsoft.com/office/drawing/2014/main" id="{963B60AF-23D0-5B76-3C42-0AEF371A8FEB}"/>
-              </a:ext>
-            </a:extLst>
-          </p:cNvPr>
-          <p:cNvPicPr>
-            <a:picLocks noChangeAspect="1" noChangeArrowheads="1"/>
-          </p:cNvPicPr>
-          <p:nvPr/>
-        </p:nvPicPr>
-        <p:blipFill>
-          <a:blip r:embed="rId3">
-            <a:extLst>
-              <a:ext uri="{28A0092B-C50C-407E-A947-70E740481C1C}">
-                <a14:useLocalDpi xmlns:a14="http://schemas.microsoft.com/office/drawing/2010/main" val="0"/>
-              </a:ext>
-            </a:extLst>
-          </a:blip>
-          <a:srcRect/>
-          <a:stretch>
-            <a:fillRect/>
-          </a:stretch>
-        </p:blipFill>
-        <p:spPr bwMode="auto">
-          <a:xfrm>
-            <a:off x="6096000" y="1690689"/>
-            <a:ext cx="4841861" cy="2723547"/>
-          </a:xfrm>
-          <a:prstGeom prst="rect">
-            <a:avLst/>
-          </a:prstGeom>
-          <a:noFill/>
-          <a:extLst>
-            <a:ext uri="{909E8E84-426E-40DD-AFC4-6F175D3DCCD1}">
-              <a14:hiddenFill xmlns:a14="http://schemas.microsoft.com/office/drawing/2010/main">
-                <a:solidFill>
-                  <a:srgbClr val="FFFFFF"/>
-                </a:solidFill>
-              </a14:hiddenFill>
-            </a:ext>
-          </a:extLst>
-        </p:spPr>
-      </p:pic>
-      <p:pic>
-        <p:nvPicPr>
-          <p:cNvPr id="5" name="Picture 4">
-            <a:extLst>
-              <a:ext uri="{FF2B5EF4-FFF2-40B4-BE49-F238E27FC236}">
-                <a16:creationId xmlns:a16="http://schemas.microsoft.com/office/drawing/2014/main" id="{3EA0BBE0-61CF-B5A9-C2D5-35B718EC21B1}"/>
+                <a16:creationId xmlns:a16="http://schemas.microsoft.com/office/drawing/2014/main" id="{8E37F40E-7E0B-C00B-F9C6-EDF62A3B8D6B}"/>
               </a:ext>
             </a:extLst>
           </p:cNvPr>
@@ -4767,15 +4974,21 @@
           <p:nvPr/>
         </p:nvPicPr>
         <p:blipFill>
-          <a:blip r:embed="rId4"/>
+          <a:blip r:embed="rId4">
+            <a:extLst>
+              <a:ext uri="{28A0092B-C50C-407E-A947-70E740481C1C}">
+                <a14:useLocalDpi xmlns:a14="http://schemas.microsoft.com/office/drawing/2010/main" val="0"/>
+              </a:ext>
+            </a:extLst>
+          </a:blip>
           <a:stretch>
             <a:fillRect/>
           </a:stretch>
         </p:blipFill>
         <p:spPr>
           <a:xfrm>
-            <a:off x="2231722" y="4414236"/>
-            <a:ext cx="2801100" cy="2166554"/>
+            <a:off x="6096000" y="1302214"/>
+            <a:ext cx="4835179" cy="5412911"/>
           </a:xfrm>
           <a:prstGeom prst="rect">
             <a:avLst/>
@@ -4880,28 +5093,59 @@
             <a:pPr lvl="1"/>
             <a:r>
               <a:rPr lang="en-US" dirty="0"/>
-              <a:t>I need to think of a good name for the game.</a:t>
+              <a:t>Getting the </a:t>
+            </a:r>
+            <a:r>
+              <a:rPr lang="en-US" dirty="0" err="1"/>
+              <a:t>gdscript</a:t>
+            </a:r>
+            <a:r>
+              <a:rPr lang="en-US" dirty="0"/>
+              <a:t> shader to pause when the game stops.</a:t>
             </a:r>
           </a:p>
           <a:p>
             <a:pPr lvl="1"/>
             <a:r>
               <a:rPr lang="en-US" dirty="0"/>
-              <a:t>I will need to figure out how to spawn enemies off screen but not so far from the player that it takes a long time to show up.</a:t>
+              <a:t>When the </a:t>
+            </a:r>
+            <a:r>
+              <a:rPr lang="en-US" dirty="0" err="1"/>
+              <a:t>gdscript</a:t>
+            </a:r>
+            <a:r>
+              <a:rPr lang="en-US" dirty="0"/>
+              <a:t> DOES pause, it reverts to its beginning state, looking very jarring all of a sudden.</a:t>
             </a:r>
           </a:p>
           <a:p>
             <a:pPr lvl="1"/>
             <a:r>
               <a:rPr lang="en-US" dirty="0"/>
-              <a:t>I need to figure out pathing around obstacles for enemies.</a:t>
+              <a:t>How to increase the speed of the pipe generation over time.</a:t>
             </a:r>
           </a:p>
           <a:p>
             <a:pPr lvl="1"/>
             <a:r>
               <a:rPr lang="en-US" dirty="0"/>
-              <a:t>I need to plan out power-ups/different weapons for the player.</a:t>
+              <a:t>How to create a start, quit, and restart button.</a:t>
+            </a:r>
+          </a:p>
+          <a:p>
+            <a:pPr lvl="1"/>
+            <a:r>
+              <a:rPr lang="en-US" dirty="0"/>
+              <a:t>When I restart the game, the pipes do not </a:t>
+            </a:r>
+            <a:r>
+              <a:rPr lang="en-US" dirty="0" err="1"/>
+              <a:t>despawn</a:t>
+            </a:r>
+            <a:r>
+              <a:rPr lang="en-US" dirty="0"/>
+              <a:t>.</a:t>
             </a:r>
           </a:p>
         </p:txBody>
@@ -5010,35 +5254,21 @@
             <a:pPr lvl="1"/>
             <a:r>
               <a:rPr lang="en-US" dirty="0"/>
-              <a:t>File structure</a:t>
+              <a:t>Pipes could be two different nodes, one for the top and one for the bottom. That way you can vary how the pipes spawn so it is not always in pairs.</a:t>
             </a:r>
           </a:p>
           <a:p>
             <a:pPr lvl="1"/>
             <a:r>
               <a:rPr lang="en-US" dirty="0"/>
-              <a:t>Commenting / algorithm planning</a:t>
+              <a:t>Lots of variables defined in main, maybe could use a global node to hold them for organization.</a:t>
             </a:r>
           </a:p>
           <a:p>
             <a:pPr lvl="1"/>
             <a:r>
               <a:rPr lang="en-US" dirty="0"/>
-              <a:t>Repetitiveness</a:t>
-            </a:r>
-          </a:p>
-          <a:p>
-            <a:pPr lvl="1"/>
-            <a:r>
-              <a:rPr lang="en-US" dirty="0"/>
-              <a:t>Readability</a:t>
-            </a:r>
-          </a:p>
-          <a:p>
-            <a:pPr lvl="1"/>
-            <a:r>
-              <a:rPr lang="en-US" dirty="0"/>
-              <a:t>Succinctness </a:t>
+              <a:t>Folder structure setup well, with folders for scripts, scenes, and assets.</a:t>
             </a:r>
           </a:p>
         </p:txBody>
@@ -5134,32 +5364,19 @@
           <a:p>
             <a:r>
               <a:rPr lang="en-US" dirty="0"/>
-              <a:t>Delete this and add 2-3 takeaways from your discussion with your peer</a:t>
-            </a:r>
-          </a:p>
-          <a:p>
-            <a:r>
-              <a:rPr lang="en-US" dirty="0"/>
-              <a:t>Learned X</a:t>
-            </a:r>
-          </a:p>
-          <a:p>
-            <a:r>
-              <a:rPr lang="en-US" dirty="0"/>
-              <a:t>Decided Y would be important to focus on next</a:t>
-            </a:r>
-          </a:p>
-          <a:p>
-            <a:r>
-              <a:rPr lang="en-US" dirty="0"/>
-              <a:t>Focus on coding principles:</a:t>
-            </a:r>
-          </a:p>
-          <a:p>
-            <a:pPr lvl="1"/>
-            <a:r>
-              <a:rPr lang="en-US" dirty="0"/>
-              <a:t>Commenting, indentation, good variable names, general structure</a:t>
+              <a:t>Learned how to use buttons, so next focus will to get working menu and restart icons.</a:t>
+            </a:r>
+          </a:p>
+          <a:p>
+            <a:r>
+              <a:rPr lang="en-US" dirty="0"/>
+              <a:t>Figure out how to pause the background shader at its exact position when the player collides or goes out of bounds.</a:t>
+            </a:r>
+          </a:p>
+          <a:p>
+            <a:r>
+              <a:rPr lang="en-US" dirty="0"/>
+              <a:t>Clean up my code by writing some comments for the parts that are not self explanatory.</a:t>
             </a:r>
           </a:p>
           <a:p>
@@ -5259,28 +5476,53 @@
           <a:p>
             <a:r>
               <a:rPr lang="en-US" dirty="0"/>
-              <a:t>Delete and add your own reflection on:</a:t>
-            </a:r>
-          </a:p>
-          <a:p>
-            <a:pPr lvl="1"/>
-            <a:r>
-              <a:rPr lang="en-US" dirty="0"/>
-              <a:t>Unknowns about Godot</a:t>
-            </a:r>
-          </a:p>
-          <a:p>
-            <a:pPr lvl="1"/>
-            <a:r>
-              <a:rPr lang="en-US" dirty="0"/>
-              <a:t>New resources found</a:t>
-            </a:r>
-          </a:p>
-          <a:p>
-            <a:pPr lvl="1"/>
-            <a:r>
-              <a:rPr lang="en-US" dirty="0"/>
-              <a:t>What you tried that didn’t work – and how you’re going to try something new</a:t>
+              <a:t>Didn’t know about </a:t>
+            </a:r>
+            <a:r>
+              <a:rPr lang="en-US" dirty="0" err="1"/>
+              <a:t>gdscript</a:t>
+            </a:r>
+            <a:r>
+              <a:rPr lang="en-US" dirty="0"/>
+              <a:t> shaders until I was trying to figure out how to do parallax. Seems parallax requires a Camera node but my game doesn’t use one and that led me to </a:t>
+            </a:r>
+            <a:r>
+              <a:rPr lang="en-US" dirty="0" err="1"/>
+              <a:t>gdscripts</a:t>
+            </a:r>
+            <a:r>
+              <a:rPr lang="en-US" dirty="0"/>
+              <a:t> and how you can use them as material for Sprites or </a:t>
+            </a:r>
+            <a:r>
+              <a:rPr lang="en-US" dirty="0" err="1"/>
+              <a:t>TextureRects</a:t>
+            </a:r>
+            <a:r>
+              <a:rPr lang="en-US" dirty="0"/>
+              <a:t>.</a:t>
+            </a:r>
+          </a:p>
+          <a:p>
+            <a:r>
+              <a:rPr lang="en-US" dirty="0"/>
+              <a:t>The background animation is from an asset on </a:t>
+            </a:r>
+            <a:r>
+              <a:rPr lang="en-US" dirty="0" err="1"/>
+              <a:t>itch.io</a:t>
+            </a:r>
+            <a:r>
+              <a:rPr lang="en-US" dirty="0"/>
+              <a:t> and it came with a built in </a:t>
+            </a:r>
+            <a:r>
+              <a:rPr lang="en-US" dirty="0" err="1"/>
+              <a:t>gdshader</a:t>
+            </a:r>
+            <a:r>
+              <a:rPr lang="en-US" dirty="0"/>
+              <a:t> script that I will have to modify to pause like I need it to.</a:t>
             </a:r>
           </a:p>
         </p:txBody>
@@ -5400,7 +5642,15 @@
             </a:pPr>
             <a:r>
               <a:rPr lang="en-US" dirty="0"/>
-              <a:t>Project progress			poor	acceptable	excellent</a:t>
+              <a:t>Project progress			poor	</a:t>
+            </a:r>
+            <a:r>
+              <a:rPr lang="en-US" b="1" dirty="0"/>
+              <a:t>acceptable</a:t>
+            </a:r>
+            <a:r>
+              <a:rPr lang="en-US" dirty="0"/>
+              <a:t>	excellent</a:t>
             </a:r>
           </a:p>
           <a:p>
@@ -5409,7 +5659,15 @@
             </a:pPr>
             <a:r>
               <a:rPr lang="en-US" dirty="0"/>
-              <a:t>Variable naming			poor	acceptable	excellent</a:t>
+              <a:t>Variable naming			poor	</a:t>
+            </a:r>
+            <a:r>
+              <a:rPr lang="en-US" b="1" dirty="0"/>
+              <a:t>acceptable</a:t>
+            </a:r>
+            <a:r>
+              <a:rPr lang="en-US" dirty="0"/>
+              <a:t>	excellent</a:t>
             </a:r>
           </a:p>
           <a:p>
@@ -5418,7 +5676,11 @@
             </a:pPr>
             <a:r>
               <a:rPr lang="en-US" dirty="0"/>
-              <a:t>Debugging / problem solving	poor	acceptable	excellent</a:t>
+              <a:t>Debugging / problem solving	poor	acceptable	</a:t>
+            </a:r>
+            <a:r>
+              <a:rPr lang="en-US" b="1" dirty="0"/>
+              <a:t>excellent</a:t>
             </a:r>
           </a:p>
           <a:p>
@@ -5427,7 +5689,11 @@
             </a:pPr>
             <a:r>
               <a:rPr lang="en-US" dirty="0"/>
-              <a:t>Godot exploration			poor	acceptable	excellent</a:t>
+              <a:t>Godot exploration			poor	acceptable	</a:t>
+            </a:r>
+            <a:r>
+              <a:rPr lang="en-US" b="1" dirty="0"/>
+              <a:t>excellent</a:t>
             </a:r>
           </a:p>
           <a:p>
@@ -5436,7 +5702,15 @@
             </a:pPr>
             <a:r>
               <a:rPr lang="en-US" dirty="0"/>
-              <a:t>Polish plans				poor	acceptable	excellent</a:t>
+              <a:t>Polish plans				poor	</a:t>
+            </a:r>
+            <a:r>
+              <a:rPr lang="en-US" b="1" dirty="0"/>
+              <a:t>acceptable</a:t>
+            </a:r>
+            <a:r>
+              <a:rPr lang="en-US" dirty="0"/>
+              <a:t>	excellent</a:t>
             </a:r>
           </a:p>
         </p:txBody>
@@ -5530,6 +5804,41 @@
           <a:bodyPr/>
           <a:lstStyle/>
           <a:p>
+            <a:r>
+              <a:rPr lang="en-US" dirty="0"/>
+              <a:t>Focus on making a moving ground that is also a collision object.</a:t>
+            </a:r>
+          </a:p>
+          <a:p>
+            <a:r>
+              <a:rPr lang="en-US" dirty="0"/>
+              <a:t>Adjust pipe spawning range, and speed.</a:t>
+            </a:r>
+          </a:p>
+          <a:p>
+            <a:r>
+              <a:rPr lang="en-US" dirty="0"/>
+              <a:t>Employ an elapsed time metric to store the position of my background shader when it stops.</a:t>
+            </a:r>
+          </a:p>
+          <a:p>
+            <a:r>
+              <a:rPr lang="en-US" dirty="0"/>
+              <a:t>I actually need a camera node, because when you go full screen the game renders parts outside the viewport when it shouldn’t</a:t>
+            </a:r>
+            <a:r>
+              <a:rPr lang="en-US"/>
+              <a:t>. </a:t>
+            </a:r>
+            <a:endParaRPr lang="en-US" dirty="0"/>
+          </a:p>
+          <a:p>
+            <a:endParaRPr lang="en-US" dirty="0"/>
+          </a:p>
+          <a:p>
+            <a:pPr marL="0" indent="0">
+              <a:buNone/>
+            </a:pPr>
             <a:endParaRPr lang="en-US" dirty="0"/>
           </a:p>
         </p:txBody>

</xml_diff>